<commit_message>
API added to PowerPoint Presentation
</commit_message>
<xml_diff>
--- a/OzkarHPD/DowJonesLiterature.pptx
+++ b/OzkarHPD/DowJonesLiterature.pptx
@@ -5,10 +5,12 @@
     <p:sldMasterId id="2147483648" r:id="rId1"/>
   </p:sldMasterIdLst>
   <p:sldIdLst>
-    <p:sldId id="256" r:id="rId2"/>
-    <p:sldId id="259" r:id="rId3"/>
-    <p:sldId id="261" r:id="rId4"/>
-    <p:sldId id="260" r:id="rId5"/>
+    <p:sldId id="266" r:id="rId2"/>
+    <p:sldId id="264" r:id="rId3"/>
+    <p:sldId id="256" r:id="rId4"/>
+    <p:sldId id="259" r:id="rId5"/>
+    <p:sldId id="261" r:id="rId6"/>
+    <p:sldId id="263" r:id="rId7"/>
   </p:sldIdLst>
   <p:sldSz cx="12192000" cy="6858000"/>
   <p:notesSz cx="6858000" cy="9144000"/>
@@ -3329,6 +3331,321 @@
           <a:chExt cx="0" cy="0"/>
         </a:xfrm>
       </p:grpSpPr>
+      <p:sp>
+        <p:nvSpPr>
+          <p:cNvPr id="2" name="Title 1">
+            <a:extLst>
+              <a:ext uri="{FF2B5EF4-FFF2-40B4-BE49-F238E27FC236}">
+                <a16:creationId xmlns:a16="http://schemas.microsoft.com/office/drawing/2014/main" id="{0056D489-1692-954C-A17C-E1B7C45FC8AD}"/>
+              </a:ext>
+            </a:extLst>
+          </p:cNvPr>
+          <p:cNvSpPr>
+            <a:spLocks noGrp="1"/>
+          </p:cNvSpPr>
+          <p:nvPr>
+            <p:ph type="title"/>
+          </p:nvPr>
+        </p:nvSpPr>
+        <p:spPr>
+          <a:xfrm>
+            <a:off x="838200" y="365125"/>
+            <a:ext cx="9559247" cy="1524305"/>
+          </a:xfrm>
+        </p:spPr>
+        <p:txBody>
+          <a:bodyPr>
+            <a:normAutofit/>
+          </a:bodyPr>
+          <a:lstStyle/>
+          <a:p>
+            <a:r>
+              <a:rPr lang="en-US" sz="3600" b="1" dirty="0"/>
+              <a:t>Possible Reasons for Increased </a:t>
+            </a:r>
+            <a:br>
+              <a:rPr lang="en-US" sz="3600" b="1" dirty="0"/>
+            </a:br>
+            <a:r>
+              <a:rPr lang="en-US" sz="3600" b="1" dirty="0"/>
+              <a:t>Trend of Crimes</a:t>
+            </a:r>
+          </a:p>
+        </p:txBody>
+      </p:sp>
+      <p:pic>
+        <p:nvPicPr>
+          <p:cNvPr id="5" name="Picture 4">
+            <a:extLst>
+              <a:ext uri="{FF2B5EF4-FFF2-40B4-BE49-F238E27FC236}">
+                <a16:creationId xmlns:a16="http://schemas.microsoft.com/office/drawing/2014/main" id="{7E87C8B9-8362-634F-8E05-DD9C32DE8126}"/>
+              </a:ext>
+            </a:extLst>
+          </p:cNvPr>
+          <p:cNvPicPr>
+            <a:picLocks noChangeAspect="1"/>
+          </p:cNvPicPr>
+          <p:nvPr/>
+        </p:nvPicPr>
+        <p:blipFill>
+          <a:blip r:embed="rId2"/>
+          <a:stretch>
+            <a:fillRect/>
+          </a:stretch>
+        </p:blipFill>
+        <p:spPr>
+          <a:xfrm>
+            <a:off x="0" y="20565"/>
+            <a:ext cx="12192000" cy="277091"/>
+          </a:xfrm>
+          <a:prstGeom prst="rect">
+            <a:avLst/>
+          </a:prstGeom>
+        </p:spPr>
+      </p:pic>
+      <p:pic>
+        <p:nvPicPr>
+          <p:cNvPr id="7" name="Content Placeholder 6">
+            <a:extLst>
+              <a:ext uri="{FF2B5EF4-FFF2-40B4-BE49-F238E27FC236}">
+                <a16:creationId xmlns:a16="http://schemas.microsoft.com/office/drawing/2014/main" id="{BDB02929-1B1C-B34C-AEE6-AB4692D66F86}"/>
+              </a:ext>
+            </a:extLst>
+          </p:cNvPr>
+          <p:cNvPicPr>
+            <a:picLocks noGrp="1" noChangeAspect="1"/>
+          </p:cNvPicPr>
+          <p:nvPr>
+            <p:ph idx="1"/>
+          </p:nvPr>
+        </p:nvPicPr>
+        <p:blipFill>
+          <a:blip r:embed="rId3"/>
+          <a:stretch>
+            <a:fillRect/>
+          </a:stretch>
+        </p:blipFill>
+        <p:spPr>
+          <a:xfrm>
+            <a:off x="-926935" y="2024010"/>
+            <a:ext cx="14210256" cy="4736752"/>
+          </a:xfrm>
+        </p:spPr>
+      </p:pic>
+      <p:pic>
+        <p:nvPicPr>
+          <p:cNvPr id="11" name="Picture 10">
+            <a:extLst>
+              <a:ext uri="{FF2B5EF4-FFF2-40B4-BE49-F238E27FC236}">
+                <a16:creationId xmlns:a16="http://schemas.microsoft.com/office/drawing/2014/main" id="{1E2E0C62-52D1-2641-A433-BBFDEC666FBF}"/>
+              </a:ext>
+            </a:extLst>
+          </p:cNvPr>
+          <p:cNvPicPr>
+            <a:picLocks noChangeAspect="1"/>
+          </p:cNvPicPr>
+          <p:nvPr/>
+        </p:nvPicPr>
+        <p:blipFill>
+          <a:blip r:embed="rId4"/>
+          <a:stretch>
+            <a:fillRect/>
+          </a:stretch>
+        </p:blipFill>
+        <p:spPr>
+          <a:xfrm>
+            <a:off x="8496050" y="297656"/>
+            <a:ext cx="3508268" cy="2613382"/>
+          </a:xfrm>
+          <a:prstGeom prst="rect">
+            <a:avLst/>
+          </a:prstGeom>
+        </p:spPr>
+      </p:pic>
+      <p:sp>
+        <p:nvSpPr>
+          <p:cNvPr id="9" name="TextBox 8">
+            <a:extLst>
+              <a:ext uri="{FF2B5EF4-FFF2-40B4-BE49-F238E27FC236}">
+                <a16:creationId xmlns:a16="http://schemas.microsoft.com/office/drawing/2014/main" id="{8A4D2EB9-BDAF-B84F-80C4-055BDA79506B}"/>
+              </a:ext>
+            </a:extLst>
+          </p:cNvPr>
+          <p:cNvSpPr txBox="1"/>
+          <p:nvPr/>
+        </p:nvSpPr>
+        <p:spPr>
+          <a:xfrm rot="20779446">
+            <a:off x="7014992" y="1092714"/>
+            <a:ext cx="2146357" cy="369332"/>
+          </a:xfrm>
+          <a:prstGeom prst="rect">
+            <a:avLst/>
+          </a:prstGeom>
+          <a:noFill/>
+        </p:spPr>
+        <p:txBody>
+          <a:bodyPr wrap="none" rtlCol="0">
+            <a:spAutoFit/>
+          </a:bodyPr>
+          <a:lstStyle/>
+          <a:p>
+            <a:r>
+              <a:rPr lang="en-US" dirty="0"/>
+              <a:t>Trying to make sense</a:t>
+            </a:r>
+          </a:p>
+        </p:txBody>
+      </p:sp>
+    </p:spTree>
+    <p:extLst>
+      <p:ext uri="{BB962C8B-B14F-4D97-AF65-F5344CB8AC3E}">
+        <p14:creationId xmlns:p14="http://schemas.microsoft.com/office/powerpoint/2010/main" val="2559948172"/>
+      </p:ext>
+    </p:extLst>
+  </p:cSld>
+  <p:clrMapOvr>
+    <a:masterClrMapping/>
+  </p:clrMapOvr>
+</p:sld>
+</file>
+
+<file path=ppt/slides/slide2.xml><?xml version="1.0" encoding="utf-8"?>
+<p:sld xmlns:a="http://schemas.openxmlformats.org/drawingml/2006/main" xmlns:r="http://schemas.openxmlformats.org/officeDocument/2006/relationships" xmlns:p="http://schemas.openxmlformats.org/presentationml/2006/main">
+  <p:cSld>
+    <p:spTree>
+      <p:nvGrpSpPr>
+        <p:cNvPr id="1" name=""/>
+        <p:cNvGrpSpPr/>
+        <p:nvPr/>
+      </p:nvGrpSpPr>
+      <p:grpSpPr>
+        <a:xfrm>
+          <a:off x="0" y="0"/>
+          <a:ext cx="0" cy="0"/>
+          <a:chOff x="0" y="0"/>
+          <a:chExt cx="0" cy="0"/>
+        </a:xfrm>
+      </p:grpSpPr>
+      <p:sp>
+        <p:nvSpPr>
+          <p:cNvPr id="2" name="Title 1">
+            <a:extLst>
+              <a:ext uri="{FF2B5EF4-FFF2-40B4-BE49-F238E27FC236}">
+                <a16:creationId xmlns:a16="http://schemas.microsoft.com/office/drawing/2014/main" id="{0056D489-1692-954C-A17C-E1B7C45FC8AD}"/>
+              </a:ext>
+            </a:extLst>
+          </p:cNvPr>
+          <p:cNvSpPr>
+            <a:spLocks noGrp="1"/>
+          </p:cNvSpPr>
+          <p:nvPr>
+            <p:ph type="title"/>
+          </p:nvPr>
+        </p:nvSpPr>
+        <p:spPr/>
+        <p:txBody>
+          <a:bodyPr>
+            <a:normAutofit/>
+          </a:bodyPr>
+          <a:lstStyle/>
+          <a:p>
+            <a:r>
+              <a:rPr lang="en-US" sz="3600" b="1" dirty="0"/>
+              <a:t>Increased Trend of Property Crimes During Holidays</a:t>
+            </a:r>
+          </a:p>
+        </p:txBody>
+      </p:sp>
+      <p:pic>
+        <p:nvPicPr>
+          <p:cNvPr id="5" name="Picture 4">
+            <a:extLst>
+              <a:ext uri="{FF2B5EF4-FFF2-40B4-BE49-F238E27FC236}">
+                <a16:creationId xmlns:a16="http://schemas.microsoft.com/office/drawing/2014/main" id="{7E87C8B9-8362-634F-8E05-DD9C32DE8126}"/>
+              </a:ext>
+            </a:extLst>
+          </p:cNvPr>
+          <p:cNvPicPr>
+            <a:picLocks noChangeAspect="1"/>
+          </p:cNvPicPr>
+          <p:nvPr/>
+        </p:nvPicPr>
+        <p:blipFill>
+          <a:blip r:embed="rId2"/>
+          <a:stretch>
+            <a:fillRect/>
+          </a:stretch>
+        </p:blipFill>
+        <p:spPr>
+          <a:xfrm>
+            <a:off x="0" y="20565"/>
+            <a:ext cx="12192000" cy="277091"/>
+          </a:xfrm>
+          <a:prstGeom prst="rect">
+            <a:avLst/>
+          </a:prstGeom>
+        </p:spPr>
+      </p:pic>
+      <p:pic>
+        <p:nvPicPr>
+          <p:cNvPr id="8" name="Content Placeholder 7">
+            <a:extLst>
+              <a:ext uri="{FF2B5EF4-FFF2-40B4-BE49-F238E27FC236}">
+                <a16:creationId xmlns:a16="http://schemas.microsoft.com/office/drawing/2014/main" id="{3D032C08-7A39-0947-8EBA-9628A9EB58E7}"/>
+              </a:ext>
+            </a:extLst>
+          </p:cNvPr>
+          <p:cNvPicPr>
+            <a:picLocks noGrp="1" noChangeAspect="1"/>
+          </p:cNvPicPr>
+          <p:nvPr>
+            <p:ph idx="1"/>
+          </p:nvPr>
+        </p:nvPicPr>
+        <p:blipFill>
+          <a:blip r:embed="rId3"/>
+          <a:stretch>
+            <a:fillRect/>
+          </a:stretch>
+        </p:blipFill>
+        <p:spPr>
+          <a:xfrm>
+            <a:off x="1705510" y="1489753"/>
+            <a:ext cx="7130894" cy="4663959"/>
+          </a:xfrm>
+        </p:spPr>
+      </p:pic>
+    </p:spTree>
+    <p:extLst>
+      <p:ext uri="{BB962C8B-B14F-4D97-AF65-F5344CB8AC3E}">
+        <p14:creationId xmlns:p14="http://schemas.microsoft.com/office/powerpoint/2010/main" val="1585345556"/>
+      </p:ext>
+    </p:extLst>
+  </p:cSld>
+  <p:clrMapOvr>
+    <a:masterClrMapping/>
+  </p:clrMapOvr>
+</p:sld>
+</file>
+
+<file path=ppt/slides/slide3.xml><?xml version="1.0" encoding="utf-8"?>
+<p:sld xmlns:a="http://schemas.openxmlformats.org/drawingml/2006/main" xmlns:r="http://schemas.openxmlformats.org/officeDocument/2006/relationships" xmlns:p="http://schemas.openxmlformats.org/presentationml/2006/main">
+  <p:cSld>
+    <p:spTree>
+      <p:nvGrpSpPr>
+        <p:cNvPr id="1" name=""/>
+        <p:cNvGrpSpPr/>
+        <p:nvPr/>
+      </p:nvGrpSpPr>
+      <p:grpSpPr>
+        <a:xfrm>
+          <a:off x="0" y="0"/>
+          <a:ext cx="0" cy="0"/>
+          <a:chOff x="0" y="0"/>
+          <a:chExt cx="0" cy="0"/>
+        </a:xfrm>
+      </p:grpSpPr>
       <p:pic>
         <p:nvPicPr>
           <p:cNvPr id="5" name="Picture 4">
@@ -3402,7 +3719,7 @@
 </p:sld>
 </file>
 
-<file path=ppt/slides/slide2.xml><?xml version="1.0" encoding="utf-8"?>
+<file path=ppt/slides/slide4.xml><?xml version="1.0" encoding="utf-8"?>
 <p:sld xmlns:a="http://schemas.openxmlformats.org/drawingml/2006/main" xmlns:r="http://schemas.openxmlformats.org/officeDocument/2006/relationships" xmlns:p="http://schemas.openxmlformats.org/presentationml/2006/main">
   <p:cSld>
     <p:spTree>
@@ -3573,7 +3890,7 @@
 </p:sld>
 </file>
 
-<file path=ppt/slides/slide3.xml><?xml version="1.0" encoding="utf-8"?>
+<file path=ppt/slides/slide5.xml><?xml version="1.0" encoding="utf-8"?>
 <p:sld xmlns:a="http://schemas.openxmlformats.org/drawingml/2006/main" xmlns:r="http://schemas.openxmlformats.org/officeDocument/2006/relationships" xmlns:p="http://schemas.openxmlformats.org/presentationml/2006/main">
   <p:cSld>
     <p:spTree>
@@ -3727,7 +4044,7 @@
         </p:blipFill>
         <p:spPr>
           <a:xfrm>
-            <a:off x="1797050" y="3100182"/>
+            <a:off x="1797050" y="3429000"/>
             <a:ext cx="8597900" cy="1181100"/>
           </a:xfrm>
           <a:prstGeom prst="rect">
@@ -3757,7 +4074,7 @@
         </p:blipFill>
         <p:spPr>
           <a:xfrm>
-            <a:off x="1797050" y="4348751"/>
+            <a:off x="1797050" y="5147359"/>
             <a:ext cx="8597900" cy="1181100"/>
           </a:xfrm>
           <a:prstGeom prst="rect">
@@ -3765,6 +4082,76 @@
           </a:prstGeom>
         </p:spPr>
       </p:pic>
+      <p:sp>
+        <p:nvSpPr>
+          <p:cNvPr id="4" name="TextBox 3">
+            <a:extLst>
+              <a:ext uri="{FF2B5EF4-FFF2-40B4-BE49-F238E27FC236}">
+                <a16:creationId xmlns:a16="http://schemas.microsoft.com/office/drawing/2014/main" id="{4274C42F-81A4-304E-99C4-D6A725B5A141}"/>
+              </a:ext>
+            </a:extLst>
+          </p:cNvPr>
+          <p:cNvSpPr txBox="1"/>
+          <p:nvPr/>
+        </p:nvSpPr>
+        <p:spPr>
+          <a:xfrm>
+            <a:off x="1797050" y="2943111"/>
+            <a:ext cx="737702" cy="584775"/>
+          </a:xfrm>
+          <a:prstGeom prst="rect">
+            <a:avLst/>
+          </a:prstGeom>
+          <a:noFill/>
+        </p:spPr>
+        <p:txBody>
+          <a:bodyPr wrap="none" rtlCol="0">
+            <a:spAutoFit/>
+          </a:bodyPr>
+          <a:lstStyle/>
+          <a:p>
+            <a:r>
+              <a:rPr lang="en-US" sz="3200" dirty="0"/>
+              <a:t>API</a:t>
+            </a:r>
+          </a:p>
+        </p:txBody>
+      </p:sp>
+      <p:sp>
+        <p:nvSpPr>
+          <p:cNvPr id="9" name="TextBox 8">
+            <a:extLst>
+              <a:ext uri="{FF2B5EF4-FFF2-40B4-BE49-F238E27FC236}">
+                <a16:creationId xmlns:a16="http://schemas.microsoft.com/office/drawing/2014/main" id="{968567AF-67B2-2D44-8853-8F86DEEFAFC9}"/>
+              </a:ext>
+            </a:extLst>
+          </p:cNvPr>
+          <p:cNvSpPr txBox="1"/>
+          <p:nvPr/>
+        </p:nvSpPr>
+        <p:spPr>
+          <a:xfrm>
+            <a:off x="1797050" y="4677569"/>
+            <a:ext cx="737702" cy="584775"/>
+          </a:xfrm>
+          <a:prstGeom prst="rect">
+            <a:avLst/>
+          </a:prstGeom>
+          <a:noFill/>
+        </p:spPr>
+        <p:txBody>
+          <a:bodyPr wrap="none" rtlCol="0">
+            <a:spAutoFit/>
+          </a:bodyPr>
+          <a:lstStyle/>
+          <a:p>
+            <a:r>
+              <a:rPr lang="en-US" sz="3200" dirty="0"/>
+              <a:t>API</a:t>
+            </a:r>
+          </a:p>
+        </p:txBody>
+      </p:sp>
     </p:spTree>
     <p:extLst>
       <p:ext uri="{BB962C8B-B14F-4D97-AF65-F5344CB8AC3E}">
@@ -3778,7 +4165,7 @@
 </p:sld>
 </file>
 
-<file path=ppt/slides/slide4.xml><?xml version="1.0" encoding="utf-8"?>
+<file path=ppt/slides/slide6.xml><?xml version="1.0" encoding="utf-8"?>
 <p:sld xmlns:a="http://schemas.openxmlformats.org/drawingml/2006/main" xmlns:r="http://schemas.openxmlformats.org/officeDocument/2006/relationships" xmlns:p="http://schemas.openxmlformats.org/presentationml/2006/main">
   <p:cSld>
     <p:spTree>
@@ -3795,97 +4182,12 @@
           <a:chExt cx="0" cy="0"/>
         </a:xfrm>
       </p:grpSpPr>
-      <p:sp>
-        <p:nvSpPr>
-          <p:cNvPr id="2" name="Title 1">
-            <a:extLst>
-              <a:ext uri="{FF2B5EF4-FFF2-40B4-BE49-F238E27FC236}">
-                <a16:creationId xmlns:a16="http://schemas.microsoft.com/office/drawing/2014/main" id="{0056D489-1692-954C-A17C-E1B7C45FC8AD}"/>
-              </a:ext>
-            </a:extLst>
-          </p:cNvPr>
-          <p:cNvSpPr>
-            <a:spLocks noGrp="1"/>
-          </p:cNvSpPr>
-          <p:nvPr>
-            <p:ph type="title"/>
-          </p:nvPr>
-        </p:nvSpPr>
-        <p:spPr/>
-        <p:txBody>
-          <a:bodyPr>
-            <a:normAutofit/>
-          </a:bodyPr>
-          <a:lstStyle/>
-          <a:p>
-            <a:r>
-              <a:rPr lang="en-US" sz="3600" b="1" dirty="0"/>
-              <a:t>Impact of Macroeconomic Conditions on Crime</a:t>
-            </a:r>
-          </a:p>
-        </p:txBody>
-      </p:sp>
-      <p:sp>
-        <p:nvSpPr>
-          <p:cNvPr id="3" name="Content Placeholder 2">
-            <a:extLst>
-              <a:ext uri="{FF2B5EF4-FFF2-40B4-BE49-F238E27FC236}">
-                <a16:creationId xmlns:a16="http://schemas.microsoft.com/office/drawing/2014/main" id="{5C52906B-074A-6B40-A8F8-EB4EA6476EAD}"/>
-              </a:ext>
-            </a:extLst>
-          </p:cNvPr>
-          <p:cNvSpPr>
-            <a:spLocks noGrp="1"/>
-          </p:cNvSpPr>
-          <p:nvPr>
-            <p:ph idx="1"/>
-          </p:nvPr>
-        </p:nvSpPr>
-        <p:spPr>
-          <a:xfrm>
-            <a:off x="2197813" y="1758157"/>
-            <a:ext cx="7000982" cy="4351338"/>
-          </a:xfrm>
-        </p:spPr>
-        <p:txBody>
-          <a:bodyPr/>
-          <a:lstStyle/>
-          <a:p>
-            <a:r>
-              <a:rPr lang="en-US" sz="2400" dirty="0"/>
-              <a:t>Literature: Macroeconomic variables had significant impact on crime </a:t>
-            </a:r>
-          </a:p>
-          <a:p>
-            <a:pPr lvl="1"/>
-            <a:r>
-              <a:rPr lang="en-US" dirty="0"/>
-              <a:t>Phase 1: Dow Jones stock market index</a:t>
-            </a:r>
-          </a:p>
-          <a:p>
-            <a:pPr marL="0" indent="0">
-              <a:buNone/>
-            </a:pPr>
-            <a:endParaRPr lang="en-US" dirty="0"/>
-          </a:p>
-          <a:p>
-            <a:pPr marL="457200" lvl="1" indent="0">
-              <a:buNone/>
-            </a:pPr>
-            <a:endParaRPr lang="en-US" dirty="0"/>
-          </a:p>
-          <a:p>
-            <a:endParaRPr lang="en-US" dirty="0"/>
-          </a:p>
-        </p:txBody>
-      </p:sp>
       <p:pic>
         <p:nvPicPr>
-          <p:cNvPr id="5" name="Picture 4">
-            <a:extLst>
-              <a:ext uri="{FF2B5EF4-FFF2-40B4-BE49-F238E27FC236}">
-                <a16:creationId xmlns:a16="http://schemas.microsoft.com/office/drawing/2014/main" id="{7E87C8B9-8362-634F-8E05-DD9C32DE8126}"/>
+          <p:cNvPr id="15" name="Picture 14">
+            <a:extLst>
+              <a:ext uri="{FF2B5EF4-FFF2-40B4-BE49-F238E27FC236}">
+                <a16:creationId xmlns:a16="http://schemas.microsoft.com/office/drawing/2014/main" id="{29BB985E-4635-4A46-9F84-79E8552DC38F}"/>
               </a:ext>
             </a:extLst>
           </p:cNvPr>
@@ -3896,6 +4198,121 @@
         </p:nvPicPr>
         <p:blipFill>
           <a:blip r:embed="rId2"/>
+          <a:stretch>
+            <a:fillRect/>
+          </a:stretch>
+        </p:blipFill>
+        <p:spPr>
+          <a:xfrm>
+            <a:off x="1849347" y="2758906"/>
+            <a:ext cx="7230865" cy="4078529"/>
+          </a:xfrm>
+          <a:prstGeom prst="rect">
+            <a:avLst/>
+          </a:prstGeom>
+        </p:spPr>
+      </p:pic>
+      <p:sp>
+        <p:nvSpPr>
+          <p:cNvPr id="2" name="Title 1">
+            <a:extLst>
+              <a:ext uri="{FF2B5EF4-FFF2-40B4-BE49-F238E27FC236}">
+                <a16:creationId xmlns:a16="http://schemas.microsoft.com/office/drawing/2014/main" id="{0056D489-1692-954C-A17C-E1B7C45FC8AD}"/>
+              </a:ext>
+            </a:extLst>
+          </p:cNvPr>
+          <p:cNvSpPr>
+            <a:spLocks noGrp="1"/>
+          </p:cNvSpPr>
+          <p:nvPr>
+            <p:ph type="title"/>
+          </p:nvPr>
+        </p:nvSpPr>
+        <p:spPr/>
+        <p:txBody>
+          <a:bodyPr>
+            <a:normAutofit/>
+          </a:bodyPr>
+          <a:lstStyle/>
+          <a:p>
+            <a:r>
+              <a:rPr lang="en-US" sz="3600" b="1" dirty="0"/>
+              <a:t>Impact of Macroeconomic Conditions on Crime</a:t>
+            </a:r>
+          </a:p>
+        </p:txBody>
+      </p:sp>
+      <p:sp>
+        <p:nvSpPr>
+          <p:cNvPr id="3" name="Content Placeholder 2">
+            <a:extLst>
+              <a:ext uri="{FF2B5EF4-FFF2-40B4-BE49-F238E27FC236}">
+                <a16:creationId xmlns:a16="http://schemas.microsoft.com/office/drawing/2014/main" id="{5C52906B-074A-6B40-A8F8-EB4EA6476EAD}"/>
+              </a:ext>
+            </a:extLst>
+          </p:cNvPr>
+          <p:cNvSpPr>
+            <a:spLocks noGrp="1"/>
+          </p:cNvSpPr>
+          <p:nvPr>
+            <p:ph idx="1"/>
+          </p:nvPr>
+        </p:nvSpPr>
+        <p:spPr>
+          <a:xfrm>
+            <a:off x="2197813" y="1758157"/>
+            <a:ext cx="7000982" cy="4351338"/>
+          </a:xfrm>
+        </p:spPr>
+        <p:txBody>
+          <a:bodyPr/>
+          <a:lstStyle/>
+          <a:p>
+            <a:r>
+              <a:rPr lang="en-US" sz="2400" dirty="0"/>
+              <a:t>Literature: Macroeconomic variables had significant impact on crime </a:t>
+            </a:r>
+          </a:p>
+          <a:p>
+            <a:pPr lvl="1"/>
+            <a:r>
+              <a:rPr lang="en-US" dirty="0"/>
+              <a:t>Phase 1: Dow Jones stock market index</a:t>
+            </a:r>
+          </a:p>
+          <a:p>
+            <a:pPr marL="0" indent="0">
+              <a:buNone/>
+            </a:pPr>
+            <a:endParaRPr lang="en-US" dirty="0"/>
+          </a:p>
+          <a:p>
+            <a:pPr marL="457200" lvl="1" indent="0">
+              <a:buNone/>
+            </a:pPr>
+            <a:endParaRPr lang="en-US" dirty="0"/>
+          </a:p>
+          <a:p>
+            <a:endParaRPr lang="en-US" dirty="0"/>
+          </a:p>
+        </p:txBody>
+      </p:sp>
+      <p:pic>
+        <p:nvPicPr>
+          <p:cNvPr id="5" name="Picture 4">
+            <a:extLst>
+              <a:ext uri="{FF2B5EF4-FFF2-40B4-BE49-F238E27FC236}">
+                <a16:creationId xmlns:a16="http://schemas.microsoft.com/office/drawing/2014/main" id="{7E87C8B9-8362-634F-8E05-DD9C32DE8126}"/>
+              </a:ext>
+            </a:extLst>
+          </p:cNvPr>
+          <p:cNvPicPr>
+            <a:picLocks noChangeAspect="1"/>
+          </p:cNvPicPr>
+          <p:nvPr/>
+        </p:nvPicPr>
+        <p:blipFill>
+          <a:blip r:embed="rId3"/>
           <a:stretch>
             <a:fillRect/>
           </a:stretch>
@@ -3910,40 +4327,10 @@
           </a:prstGeom>
         </p:spPr>
       </p:pic>
-      <p:pic>
-        <p:nvPicPr>
-          <p:cNvPr id="6" name="Picture 5">
-            <a:extLst>
-              <a:ext uri="{FF2B5EF4-FFF2-40B4-BE49-F238E27FC236}">
-                <a16:creationId xmlns:a16="http://schemas.microsoft.com/office/drawing/2014/main" id="{0666D8F1-5A90-2645-A6DB-0F24CE4050A8}"/>
-              </a:ext>
-            </a:extLst>
-          </p:cNvPr>
-          <p:cNvPicPr>
-            <a:picLocks noChangeAspect="1"/>
-          </p:cNvPicPr>
-          <p:nvPr/>
-        </p:nvPicPr>
-        <p:blipFill>
-          <a:blip r:embed="rId3"/>
-          <a:stretch>
-            <a:fillRect/>
-          </a:stretch>
-        </p:blipFill>
-        <p:spPr>
-          <a:xfrm>
-            <a:off x="1893870" y="2835275"/>
-            <a:ext cx="7229582" cy="3657600"/>
-          </a:xfrm>
-          <a:prstGeom prst="rect">
-            <a:avLst/>
-          </a:prstGeom>
-        </p:spPr>
-      </p:pic>
     </p:spTree>
     <p:extLst>
       <p:ext uri="{BB962C8B-B14F-4D97-AF65-F5344CB8AC3E}">
-        <p14:creationId xmlns:p14="http://schemas.microsoft.com/office/powerpoint/2010/main" val="1949646337"/>
+        <p14:creationId xmlns:p14="http://schemas.microsoft.com/office/powerpoint/2010/main" val="3709019055"/>
       </p:ext>
     </p:extLst>
   </p:cSld>

</xml_diff>